<commit_message>
Proper Formatting via HTML
</commit_message>
<xml_diff>
--- a/pp-source-format/test-documents/single.pptx
+++ b/pp-source-format/test-documents/single.pptx
@@ -154,10 +154,9 @@
           </a:lstStyle>
           <a:p>
             <a:r>
-              <a:rPr lang="de-DE" smtClean="0"/>
+              <a:rPr lang="de-DE"/>
               <a:t>Titelmasterformat durch Klicken bearbeiten</a:t>
             </a:r>
-            <a:endParaRPr lang="de-DE"/>
           </a:p>
         </p:txBody>
       </p:sp>
@@ -219,10 +218,9 @@
           </a:lstStyle>
           <a:p>
             <a:r>
-              <a:rPr lang="de-DE" smtClean="0"/>
+              <a:rPr lang="de-DE"/>
               <a:t>Formatvorlage des Untertitelmasters durch Klicken bearbeiten</a:t>
             </a:r>
-            <a:endParaRPr lang="de-DE"/>
           </a:p>
         </p:txBody>
       </p:sp>
@@ -243,7 +241,7 @@
           <a:p>
             <a:fld id="{3D710087-5C47-4ACE-AE63-DCD7247B7F2A}" type="datetimeFigureOut">
               <a:rPr lang="de-DE" smtClean="0"/>
-              <a:t>20.10.2020</a:t>
+              <a:t>21.10.2020</a:t>
             </a:fld>
             <a:endParaRPr lang="de-DE"/>
           </a:p>
@@ -337,10 +335,9 @@
           <a:lstStyle/>
           <a:p>
             <a:r>
-              <a:rPr lang="de-DE" smtClean="0"/>
+              <a:rPr lang="de-DE"/>
               <a:t>Titelmasterformat durch Klicken bearbeiten</a:t>
             </a:r>
-            <a:endParaRPr lang="de-DE"/>
           </a:p>
         </p:txBody>
       </p:sp>
@@ -361,38 +358,37 @@
           <a:p>
             <a:pPr lvl="0"/>
             <a:r>
-              <a:rPr lang="de-DE" smtClean="0"/>
+              <a:rPr lang="de-DE"/>
               <a:t>Formatvorlagen des Textmasters bearbeiten</a:t>
             </a:r>
           </a:p>
           <a:p>
             <a:pPr lvl="1"/>
             <a:r>
-              <a:rPr lang="de-DE" smtClean="0"/>
+              <a:rPr lang="de-DE"/>
               <a:t>Zweite Ebene</a:t>
             </a:r>
           </a:p>
           <a:p>
             <a:pPr lvl="2"/>
             <a:r>
-              <a:rPr lang="de-DE" smtClean="0"/>
+              <a:rPr lang="de-DE"/>
               <a:t>Dritte Ebene</a:t>
             </a:r>
           </a:p>
           <a:p>
             <a:pPr lvl="3"/>
             <a:r>
-              <a:rPr lang="de-DE" smtClean="0"/>
+              <a:rPr lang="de-DE"/>
               <a:t>Vierte Ebene</a:t>
             </a:r>
           </a:p>
           <a:p>
             <a:pPr lvl="4"/>
             <a:r>
-              <a:rPr lang="de-DE" smtClean="0"/>
+              <a:rPr lang="de-DE"/>
               <a:t>Fünfte Ebene</a:t>
             </a:r>
-            <a:endParaRPr lang="de-DE"/>
           </a:p>
         </p:txBody>
       </p:sp>
@@ -413,7 +409,7 @@
           <a:p>
             <a:fld id="{3D710087-5C47-4ACE-AE63-DCD7247B7F2A}" type="datetimeFigureOut">
               <a:rPr lang="de-DE" smtClean="0"/>
-              <a:t>20.10.2020</a:t>
+              <a:t>21.10.2020</a:t>
             </a:fld>
             <a:endParaRPr lang="de-DE"/>
           </a:p>
@@ -512,10 +508,9 @@
           <a:lstStyle/>
           <a:p>
             <a:r>
-              <a:rPr lang="de-DE" smtClean="0"/>
+              <a:rPr lang="de-DE"/>
               <a:t>Titelmasterformat durch Klicken bearbeiten</a:t>
             </a:r>
-            <a:endParaRPr lang="de-DE"/>
           </a:p>
         </p:txBody>
       </p:sp>
@@ -541,38 +536,37 @@
           <a:p>
             <a:pPr lvl="0"/>
             <a:r>
-              <a:rPr lang="de-DE" smtClean="0"/>
+              <a:rPr lang="de-DE"/>
               <a:t>Formatvorlagen des Textmasters bearbeiten</a:t>
             </a:r>
           </a:p>
           <a:p>
             <a:pPr lvl="1"/>
             <a:r>
-              <a:rPr lang="de-DE" smtClean="0"/>
+              <a:rPr lang="de-DE"/>
               <a:t>Zweite Ebene</a:t>
             </a:r>
           </a:p>
           <a:p>
             <a:pPr lvl="2"/>
             <a:r>
-              <a:rPr lang="de-DE" smtClean="0"/>
+              <a:rPr lang="de-DE"/>
               <a:t>Dritte Ebene</a:t>
             </a:r>
           </a:p>
           <a:p>
             <a:pPr lvl="3"/>
             <a:r>
-              <a:rPr lang="de-DE" smtClean="0"/>
+              <a:rPr lang="de-DE"/>
               <a:t>Vierte Ebene</a:t>
             </a:r>
           </a:p>
           <a:p>
             <a:pPr lvl="4"/>
             <a:r>
-              <a:rPr lang="de-DE" smtClean="0"/>
+              <a:rPr lang="de-DE"/>
               <a:t>Fünfte Ebene</a:t>
             </a:r>
-            <a:endParaRPr lang="de-DE"/>
           </a:p>
         </p:txBody>
       </p:sp>
@@ -593,7 +587,7 @@
           <a:p>
             <a:fld id="{3D710087-5C47-4ACE-AE63-DCD7247B7F2A}" type="datetimeFigureOut">
               <a:rPr lang="de-DE" smtClean="0"/>
-              <a:t>20.10.2020</a:t>
+              <a:t>21.10.2020</a:t>
             </a:fld>
             <a:endParaRPr lang="de-DE"/>
           </a:p>
@@ -687,10 +681,9 @@
           <a:lstStyle/>
           <a:p>
             <a:r>
-              <a:rPr lang="de-DE" smtClean="0"/>
+              <a:rPr lang="de-DE"/>
               <a:t>Titelmasterformat durch Klicken bearbeiten</a:t>
             </a:r>
-            <a:endParaRPr lang="de-DE"/>
           </a:p>
         </p:txBody>
       </p:sp>
@@ -711,38 +704,37 @@
           <a:p>
             <a:pPr lvl="0"/>
             <a:r>
-              <a:rPr lang="de-DE" smtClean="0"/>
+              <a:rPr lang="de-DE"/>
               <a:t>Formatvorlagen des Textmasters bearbeiten</a:t>
             </a:r>
           </a:p>
           <a:p>
             <a:pPr lvl="1"/>
             <a:r>
-              <a:rPr lang="de-DE" smtClean="0"/>
+              <a:rPr lang="de-DE"/>
               <a:t>Zweite Ebene</a:t>
             </a:r>
           </a:p>
           <a:p>
             <a:pPr lvl="2"/>
             <a:r>
-              <a:rPr lang="de-DE" smtClean="0"/>
+              <a:rPr lang="de-DE"/>
               <a:t>Dritte Ebene</a:t>
             </a:r>
           </a:p>
           <a:p>
             <a:pPr lvl="3"/>
             <a:r>
-              <a:rPr lang="de-DE" smtClean="0"/>
+              <a:rPr lang="de-DE"/>
               <a:t>Vierte Ebene</a:t>
             </a:r>
           </a:p>
           <a:p>
             <a:pPr lvl="4"/>
             <a:r>
-              <a:rPr lang="de-DE" smtClean="0"/>
+              <a:rPr lang="de-DE"/>
               <a:t>Fünfte Ebene</a:t>
             </a:r>
-            <a:endParaRPr lang="de-DE"/>
           </a:p>
         </p:txBody>
       </p:sp>
@@ -763,7 +755,7 @@
           <a:p>
             <a:fld id="{3D710087-5C47-4ACE-AE63-DCD7247B7F2A}" type="datetimeFigureOut">
               <a:rPr lang="de-DE" smtClean="0"/>
-              <a:t>20.10.2020</a:t>
+              <a:t>21.10.2020</a:t>
             </a:fld>
             <a:endParaRPr lang="de-DE"/>
           </a:p>
@@ -866,10 +858,9 @@
           </a:lstStyle>
           <a:p>
             <a:r>
-              <a:rPr lang="de-DE" smtClean="0"/>
+              <a:rPr lang="de-DE"/>
               <a:t>Titelmasterformat durch Klicken bearbeiten</a:t>
             </a:r>
-            <a:endParaRPr lang="de-DE"/>
           </a:p>
         </p:txBody>
       </p:sp>
@@ -986,7 +977,7 @@
           <a:p>
             <a:pPr lvl="0"/>
             <a:r>
-              <a:rPr lang="de-DE" smtClean="0"/>
+              <a:rPr lang="de-DE"/>
               <a:t>Formatvorlagen des Textmasters bearbeiten</a:t>
             </a:r>
           </a:p>
@@ -1009,7 +1000,7 @@
           <a:p>
             <a:fld id="{3D710087-5C47-4ACE-AE63-DCD7247B7F2A}" type="datetimeFigureOut">
               <a:rPr lang="de-DE" smtClean="0"/>
-              <a:t>20.10.2020</a:t>
+              <a:t>21.10.2020</a:t>
             </a:fld>
             <a:endParaRPr lang="de-DE"/>
           </a:p>
@@ -1103,10 +1094,9 @@
           <a:lstStyle/>
           <a:p>
             <a:r>
-              <a:rPr lang="de-DE" smtClean="0"/>
+              <a:rPr lang="de-DE"/>
               <a:t>Titelmasterformat durch Klicken bearbeiten</a:t>
             </a:r>
-            <a:endParaRPr lang="de-DE"/>
           </a:p>
         </p:txBody>
       </p:sp>
@@ -1132,38 +1122,37 @@
           <a:p>
             <a:pPr lvl="0"/>
             <a:r>
-              <a:rPr lang="de-DE" smtClean="0"/>
+              <a:rPr lang="de-DE"/>
               <a:t>Formatvorlagen des Textmasters bearbeiten</a:t>
             </a:r>
           </a:p>
           <a:p>
             <a:pPr lvl="1"/>
             <a:r>
-              <a:rPr lang="de-DE" smtClean="0"/>
+              <a:rPr lang="de-DE"/>
               <a:t>Zweite Ebene</a:t>
             </a:r>
           </a:p>
           <a:p>
             <a:pPr lvl="2"/>
             <a:r>
-              <a:rPr lang="de-DE" smtClean="0"/>
+              <a:rPr lang="de-DE"/>
               <a:t>Dritte Ebene</a:t>
             </a:r>
           </a:p>
           <a:p>
             <a:pPr lvl="3"/>
             <a:r>
-              <a:rPr lang="de-DE" smtClean="0"/>
+              <a:rPr lang="de-DE"/>
               <a:t>Vierte Ebene</a:t>
             </a:r>
           </a:p>
           <a:p>
             <a:pPr lvl="4"/>
             <a:r>
-              <a:rPr lang="de-DE" smtClean="0"/>
+              <a:rPr lang="de-DE"/>
               <a:t>Fünfte Ebene</a:t>
             </a:r>
-            <a:endParaRPr lang="de-DE"/>
           </a:p>
         </p:txBody>
       </p:sp>
@@ -1189,38 +1178,37 @@
           <a:p>
             <a:pPr lvl="0"/>
             <a:r>
-              <a:rPr lang="de-DE" smtClean="0"/>
+              <a:rPr lang="de-DE"/>
               <a:t>Formatvorlagen des Textmasters bearbeiten</a:t>
             </a:r>
           </a:p>
           <a:p>
             <a:pPr lvl="1"/>
             <a:r>
-              <a:rPr lang="de-DE" smtClean="0"/>
+              <a:rPr lang="de-DE"/>
               <a:t>Zweite Ebene</a:t>
             </a:r>
           </a:p>
           <a:p>
             <a:pPr lvl="2"/>
             <a:r>
-              <a:rPr lang="de-DE" smtClean="0"/>
+              <a:rPr lang="de-DE"/>
               <a:t>Dritte Ebene</a:t>
             </a:r>
           </a:p>
           <a:p>
             <a:pPr lvl="3"/>
             <a:r>
-              <a:rPr lang="de-DE" smtClean="0"/>
+              <a:rPr lang="de-DE"/>
               <a:t>Vierte Ebene</a:t>
             </a:r>
           </a:p>
           <a:p>
             <a:pPr lvl="4"/>
             <a:r>
-              <a:rPr lang="de-DE" smtClean="0"/>
+              <a:rPr lang="de-DE"/>
               <a:t>Fünfte Ebene</a:t>
             </a:r>
-            <a:endParaRPr lang="de-DE"/>
           </a:p>
         </p:txBody>
       </p:sp>
@@ -1241,7 +1229,7 @@
           <a:p>
             <a:fld id="{3D710087-5C47-4ACE-AE63-DCD7247B7F2A}" type="datetimeFigureOut">
               <a:rPr lang="de-DE" smtClean="0"/>
-              <a:t>20.10.2020</a:t>
+              <a:t>21.10.2020</a:t>
             </a:fld>
             <a:endParaRPr lang="de-DE"/>
           </a:p>
@@ -1340,10 +1328,9 @@
           <a:lstStyle/>
           <a:p>
             <a:r>
-              <a:rPr lang="de-DE" smtClean="0"/>
+              <a:rPr lang="de-DE"/>
               <a:t>Titelmasterformat durch Klicken bearbeiten</a:t>
             </a:r>
-            <a:endParaRPr lang="de-DE"/>
           </a:p>
         </p:txBody>
       </p:sp>
@@ -1406,7 +1393,7 @@
           <a:p>
             <a:pPr lvl="0"/>
             <a:r>
-              <a:rPr lang="de-DE" smtClean="0"/>
+              <a:rPr lang="de-DE"/>
               <a:t>Formatvorlagen des Textmasters bearbeiten</a:t>
             </a:r>
           </a:p>
@@ -1434,38 +1421,37 @@
           <a:p>
             <a:pPr lvl="0"/>
             <a:r>
-              <a:rPr lang="de-DE" smtClean="0"/>
+              <a:rPr lang="de-DE"/>
               <a:t>Formatvorlagen des Textmasters bearbeiten</a:t>
             </a:r>
           </a:p>
           <a:p>
             <a:pPr lvl="1"/>
             <a:r>
-              <a:rPr lang="de-DE" smtClean="0"/>
+              <a:rPr lang="de-DE"/>
               <a:t>Zweite Ebene</a:t>
             </a:r>
           </a:p>
           <a:p>
             <a:pPr lvl="2"/>
             <a:r>
-              <a:rPr lang="de-DE" smtClean="0"/>
+              <a:rPr lang="de-DE"/>
               <a:t>Dritte Ebene</a:t>
             </a:r>
           </a:p>
           <a:p>
             <a:pPr lvl="3"/>
             <a:r>
-              <a:rPr lang="de-DE" smtClean="0"/>
+              <a:rPr lang="de-DE"/>
               <a:t>Vierte Ebene</a:t>
             </a:r>
           </a:p>
           <a:p>
             <a:pPr lvl="4"/>
             <a:r>
-              <a:rPr lang="de-DE" smtClean="0"/>
+              <a:rPr lang="de-DE"/>
               <a:t>Fünfte Ebene</a:t>
             </a:r>
-            <a:endParaRPr lang="de-DE"/>
           </a:p>
         </p:txBody>
       </p:sp>
@@ -1528,7 +1514,7 @@
           <a:p>
             <a:pPr lvl="0"/>
             <a:r>
-              <a:rPr lang="de-DE" smtClean="0"/>
+              <a:rPr lang="de-DE"/>
               <a:t>Formatvorlagen des Textmasters bearbeiten</a:t>
             </a:r>
           </a:p>
@@ -1556,38 +1542,37 @@
           <a:p>
             <a:pPr lvl="0"/>
             <a:r>
-              <a:rPr lang="de-DE" smtClean="0"/>
+              <a:rPr lang="de-DE"/>
               <a:t>Formatvorlagen des Textmasters bearbeiten</a:t>
             </a:r>
           </a:p>
           <a:p>
             <a:pPr lvl="1"/>
             <a:r>
-              <a:rPr lang="de-DE" smtClean="0"/>
+              <a:rPr lang="de-DE"/>
               <a:t>Zweite Ebene</a:t>
             </a:r>
           </a:p>
           <a:p>
             <a:pPr lvl="2"/>
             <a:r>
-              <a:rPr lang="de-DE" smtClean="0"/>
+              <a:rPr lang="de-DE"/>
               <a:t>Dritte Ebene</a:t>
             </a:r>
           </a:p>
           <a:p>
             <a:pPr lvl="3"/>
             <a:r>
-              <a:rPr lang="de-DE" smtClean="0"/>
+              <a:rPr lang="de-DE"/>
               <a:t>Vierte Ebene</a:t>
             </a:r>
           </a:p>
           <a:p>
             <a:pPr lvl="4"/>
             <a:r>
-              <a:rPr lang="de-DE" smtClean="0"/>
+              <a:rPr lang="de-DE"/>
               <a:t>Fünfte Ebene</a:t>
             </a:r>
-            <a:endParaRPr lang="de-DE"/>
           </a:p>
         </p:txBody>
       </p:sp>
@@ -1608,7 +1593,7 @@
           <a:p>
             <a:fld id="{3D710087-5C47-4ACE-AE63-DCD7247B7F2A}" type="datetimeFigureOut">
               <a:rPr lang="de-DE" smtClean="0"/>
-              <a:t>20.10.2020</a:t>
+              <a:t>21.10.2020</a:t>
             </a:fld>
             <a:endParaRPr lang="de-DE"/>
           </a:p>
@@ -1702,10 +1687,9 @@
           <a:lstStyle/>
           <a:p>
             <a:r>
-              <a:rPr lang="de-DE" smtClean="0"/>
+              <a:rPr lang="de-DE"/>
               <a:t>Titelmasterformat durch Klicken bearbeiten</a:t>
             </a:r>
-            <a:endParaRPr lang="de-DE"/>
           </a:p>
         </p:txBody>
       </p:sp>
@@ -1726,7 +1710,7 @@
           <a:p>
             <a:fld id="{3D710087-5C47-4ACE-AE63-DCD7247B7F2A}" type="datetimeFigureOut">
               <a:rPr lang="de-DE" smtClean="0"/>
-              <a:t>20.10.2020</a:t>
+              <a:t>21.10.2020</a:t>
             </a:fld>
             <a:endParaRPr lang="de-DE"/>
           </a:p>
@@ -1821,7 +1805,7 @@
           <a:p>
             <a:fld id="{3D710087-5C47-4ACE-AE63-DCD7247B7F2A}" type="datetimeFigureOut">
               <a:rPr lang="de-DE" smtClean="0"/>
-              <a:t>20.10.2020</a:t>
+              <a:t>21.10.2020</a:t>
             </a:fld>
             <a:endParaRPr lang="de-DE"/>
           </a:p>
@@ -1924,10 +1908,9 @@
           </a:lstStyle>
           <a:p>
             <a:r>
-              <a:rPr lang="de-DE" smtClean="0"/>
+              <a:rPr lang="de-DE"/>
               <a:t>Titelmasterformat durch Klicken bearbeiten</a:t>
             </a:r>
-            <a:endParaRPr lang="de-DE"/>
           </a:p>
         </p:txBody>
       </p:sp>
@@ -1981,38 +1964,37 @@
           <a:p>
             <a:pPr lvl="0"/>
             <a:r>
-              <a:rPr lang="de-DE" smtClean="0"/>
+              <a:rPr lang="de-DE"/>
               <a:t>Formatvorlagen des Textmasters bearbeiten</a:t>
             </a:r>
           </a:p>
           <a:p>
             <a:pPr lvl="1"/>
             <a:r>
-              <a:rPr lang="de-DE" smtClean="0"/>
+              <a:rPr lang="de-DE"/>
               <a:t>Zweite Ebene</a:t>
             </a:r>
           </a:p>
           <a:p>
             <a:pPr lvl="2"/>
             <a:r>
-              <a:rPr lang="de-DE" smtClean="0"/>
+              <a:rPr lang="de-DE"/>
               <a:t>Dritte Ebene</a:t>
             </a:r>
           </a:p>
           <a:p>
             <a:pPr lvl="3"/>
             <a:r>
-              <a:rPr lang="de-DE" smtClean="0"/>
+              <a:rPr lang="de-DE"/>
               <a:t>Vierte Ebene</a:t>
             </a:r>
           </a:p>
           <a:p>
             <a:pPr lvl="4"/>
             <a:r>
-              <a:rPr lang="de-DE" smtClean="0"/>
+              <a:rPr lang="de-DE"/>
               <a:t>Fünfte Ebene</a:t>
             </a:r>
-            <a:endParaRPr lang="de-DE"/>
           </a:p>
         </p:txBody>
       </p:sp>
@@ -2075,7 +2057,7 @@
           <a:p>
             <a:pPr lvl="0"/>
             <a:r>
-              <a:rPr lang="de-DE" smtClean="0"/>
+              <a:rPr lang="de-DE"/>
               <a:t>Formatvorlagen des Textmasters bearbeiten</a:t>
             </a:r>
           </a:p>
@@ -2098,7 +2080,7 @@
           <a:p>
             <a:fld id="{3D710087-5C47-4ACE-AE63-DCD7247B7F2A}" type="datetimeFigureOut">
               <a:rPr lang="de-DE" smtClean="0"/>
-              <a:t>20.10.2020</a:t>
+              <a:t>21.10.2020</a:t>
             </a:fld>
             <a:endParaRPr lang="de-DE"/>
           </a:p>
@@ -2201,10 +2183,9 @@
           </a:lstStyle>
           <a:p>
             <a:r>
-              <a:rPr lang="de-DE" smtClean="0"/>
+              <a:rPr lang="de-DE"/>
               <a:t>Titelmasterformat durch Klicken bearbeiten</a:t>
             </a:r>
-            <a:endParaRPr lang="de-DE"/>
           </a:p>
         </p:txBody>
       </p:sp>
@@ -2328,7 +2309,7 @@
           <a:p>
             <a:pPr lvl="0"/>
             <a:r>
-              <a:rPr lang="de-DE" smtClean="0"/>
+              <a:rPr lang="de-DE"/>
               <a:t>Formatvorlagen des Textmasters bearbeiten</a:t>
             </a:r>
           </a:p>
@@ -2351,7 +2332,7 @@
           <a:p>
             <a:fld id="{3D710087-5C47-4ACE-AE63-DCD7247B7F2A}" type="datetimeFigureOut">
               <a:rPr lang="de-DE" smtClean="0"/>
-              <a:t>20.10.2020</a:t>
+              <a:t>21.10.2020</a:t>
             </a:fld>
             <a:endParaRPr lang="de-DE"/>
           </a:p>
@@ -2460,10 +2441,9 @@
           <a:lstStyle/>
           <a:p>
             <a:r>
-              <a:rPr lang="de-DE" smtClean="0"/>
+              <a:rPr lang="de-DE"/>
               <a:t>Titelmasterformat durch Klicken bearbeiten</a:t>
             </a:r>
-            <a:endParaRPr lang="de-DE"/>
           </a:p>
         </p:txBody>
       </p:sp>
@@ -2494,38 +2474,37 @@
           <a:p>
             <a:pPr lvl="0"/>
             <a:r>
-              <a:rPr lang="de-DE" smtClean="0"/>
+              <a:rPr lang="de-DE"/>
               <a:t>Formatvorlagen des Textmasters bearbeiten</a:t>
             </a:r>
           </a:p>
           <a:p>
             <a:pPr lvl="1"/>
             <a:r>
-              <a:rPr lang="de-DE" smtClean="0"/>
+              <a:rPr lang="de-DE"/>
               <a:t>Zweite Ebene</a:t>
             </a:r>
           </a:p>
           <a:p>
             <a:pPr lvl="2"/>
             <a:r>
-              <a:rPr lang="de-DE" smtClean="0"/>
+              <a:rPr lang="de-DE"/>
               <a:t>Dritte Ebene</a:t>
             </a:r>
           </a:p>
           <a:p>
             <a:pPr lvl="3"/>
             <a:r>
-              <a:rPr lang="de-DE" smtClean="0"/>
+              <a:rPr lang="de-DE"/>
               <a:t>Vierte Ebene</a:t>
             </a:r>
           </a:p>
           <a:p>
             <a:pPr lvl="4"/>
             <a:r>
-              <a:rPr lang="de-DE" smtClean="0"/>
+              <a:rPr lang="de-DE"/>
               <a:t>Fünfte Ebene</a:t>
             </a:r>
-            <a:endParaRPr lang="de-DE"/>
           </a:p>
         </p:txBody>
       </p:sp>
@@ -2564,7 +2543,7 @@
           <a:p>
             <a:fld id="{3D710087-5C47-4ACE-AE63-DCD7247B7F2A}" type="datetimeFigureOut">
               <a:rPr lang="de-DE" smtClean="0"/>
-              <a:t>20.10.2020</a:t>
+              <a:t>21.10.2020</a:t>
             </a:fld>
             <a:endParaRPr lang="de-DE"/>
           </a:p>
@@ -2992,11 +2971,11 @@
           <a:lstStyle/>
           <a:p>
             <a:r>
-              <a:rPr lang="en-US" dirty="0" err="1" smtClean="0"/>
+              <a:rPr lang="en-US" dirty="0" err="1"/>
               <a:t>Int</a:t>
             </a:r>
             <a:r>
-              <a:rPr lang="en-US" dirty="0" smtClean="0"/>
+              <a:rPr lang="en-US" dirty="0"/>
               <a:t> a = 5;</a:t>
             </a:r>
           </a:p>
@@ -3117,8 +3096,13 @@
             </a:r>
             <a:r>
               <a:rPr lang="de-DE" dirty="0"/>
-              <a:t> = "John";</a:t>
-            </a:r>
+              <a:t> = </a:t>
+            </a:r>
+            <a:r>
+              <a:rPr lang="de-DE"/>
+              <a:t>"Test";</a:t>
+            </a:r>
+            <a:endParaRPr lang="de-DE" dirty="0"/>
           </a:p>
           <a:p>
             <a:r>
@@ -3131,15 +3115,7 @@
             </a:r>
             <a:r>
               <a:rPr lang="de-DE" dirty="0"/>
-              <a:t>("</a:t>
-            </a:r>
-            <a:r>
-              <a:rPr lang="de-DE" dirty="0" err="1"/>
-              <a:t>Hello</a:t>
-            </a:r>
-            <a:r>
-              <a:rPr lang="de-DE" dirty="0"/>
-              <a:t> " + </a:t>
+              <a:t>("Hello " + </a:t>
             </a:r>
             <a:r>
               <a:rPr lang="de-DE" dirty="0" err="1"/>

</xml_diff>

<commit_message>
Now proper formatting via HTML and loads of hacky workarounds
</commit_message>
<xml_diff>
--- a/pp-source-format/test-documents/single.pptx
+++ b/pp-source-format/test-documents/single.pptx
@@ -2956,8 +2956,8 @@
         </p:nvSpPr>
         <p:spPr>
           <a:xfrm>
-            <a:off x="4820653" y="1852863"/>
-            <a:ext cx="1003288" cy="646331"/>
+            <a:off x="8757372" y="2624408"/>
+            <a:ext cx="2787548" cy="461665"/>
           </a:xfrm>
           <a:prstGeom prst="rect">
             <a:avLst/>
@@ -2965,22 +2965,62 @@
           <a:noFill/>
         </p:spPr>
         <p:txBody>
-          <a:bodyPr wrap="none" rtlCol="0">
+          <a:bodyPr wrap="square" rtlCol="0">
             <a:spAutoFit/>
           </a:bodyPr>
           <a:lstStyle/>
           <a:p>
             <a:r>
-              <a:rPr lang="en-US" dirty="0" err="1"/>
-              <a:t>Int</a:t>
-            </a:r>
-            <a:r>
-              <a:rPr lang="en-US" dirty="0"/>
-              <a:t> a = 5;</a:t>
-            </a:r>
-          </a:p>
-          <a:p>
-            <a:endParaRPr lang="de-DE" dirty="0"/>
+              <a:rPr lang="de-DE" sz="2400">
+                <a:solidFill>
+                  <a:srgbClr val="B00040"/>
+                </a:solidFill>
+                <a:effectLst/>
+                <a:latin typeface="Consolas" panose="020B0609020204030204" pitchFamily="49" charset="0"/>
+              </a:rPr>
+              <a:t>int</a:t>
+            </a:r>
+            <a:r>
+              <a:rPr lang="de-DE" sz="2400">
+                <a:latin typeface="Consolas" panose="020B0609020204030204" pitchFamily="49" charset="0"/>
+              </a:rPr>
+              <a:t> a </a:t>
+            </a:r>
+            <a:r>
+              <a:rPr lang="de-DE" sz="2400">
+                <a:solidFill>
+                  <a:srgbClr val="666666"/>
+                </a:solidFill>
+                <a:effectLst/>
+                <a:latin typeface="Consolas" panose="020B0609020204030204" pitchFamily="49" charset="0"/>
+              </a:rPr>
+              <a:t>=</a:t>
+            </a:r>
+            <a:r>
+              <a:rPr lang="de-DE" sz="2400">
+                <a:latin typeface="Consolas" panose="020B0609020204030204" pitchFamily="49" charset="0"/>
+              </a:rPr>
+              <a:t> </a:t>
+            </a:r>
+            <a:r>
+              <a:rPr lang="de-DE" sz="2400">
+                <a:solidFill>
+                  <a:srgbClr val="666666"/>
+                </a:solidFill>
+                <a:effectLst/>
+                <a:latin typeface="Consolas" panose="020B0609020204030204" pitchFamily="49" charset="0"/>
+              </a:rPr>
+              <a:t>5</a:t>
+            </a:r>
+            <a:r>
+              <a:rPr lang="de-DE" sz="2400">
+                <a:latin typeface="Consolas" panose="020B0609020204030204" pitchFamily="49" charset="0"/>
+              </a:rPr>
+              <a:t>;</a:t>
+            </a:r>
+            <a:endParaRPr lang="de-DE" sz="2400" dirty="0">
+              <a:latin typeface="Consolas" panose="020B0609020204030204" pitchFamily="49" charset="0"/>
+            </a:endParaRPr>
           </a:p>
         </p:txBody>
       </p:sp>
@@ -2992,154 +3032,301 @@
         </p:nvSpPr>
         <p:spPr>
           <a:xfrm>
-            <a:off x="3048000" y="1997839"/>
-            <a:ext cx="6096000" cy="2862322"/>
+            <a:off x="752559" y="2024243"/>
+            <a:ext cx="7679342" cy="2308324"/>
           </a:xfrm>
           <a:prstGeom prst="rect">
             <a:avLst/>
           </a:prstGeom>
         </p:spPr>
         <p:txBody>
-          <a:bodyPr>
+          <a:bodyPr wrap="square">
             <a:spAutoFit/>
           </a:bodyPr>
           <a:lstStyle/>
           <a:p>
-            <a:endParaRPr lang="de-DE" dirty="0"/>
-          </a:p>
-          <a:p>
-            <a:endParaRPr lang="de-DE" dirty="0"/>
-          </a:p>
-          <a:p>
-            <a:endParaRPr lang="de-DE" dirty="0"/>
-          </a:p>
-          <a:p>
-            <a:r>
-              <a:rPr lang="de-DE" dirty="0" err="1"/>
+            <a:r>
+              <a:rPr lang="de-DE" sz="2400" b="1">
+                <a:solidFill>
+                  <a:srgbClr val="008000"/>
+                </a:solidFill>
+                <a:effectLst/>
+                <a:latin typeface="Consolas" panose="020B0609020204030204" pitchFamily="49" charset="0"/>
+              </a:rPr>
               <a:t>public</a:t>
             </a:r>
             <a:r>
-              <a:rPr lang="de-DE" dirty="0"/>
+              <a:rPr lang="de-DE" sz="2400">
+                <a:latin typeface="Consolas" panose="020B0609020204030204" pitchFamily="49" charset="0"/>
+              </a:rPr>
               <a:t> </a:t>
             </a:r>
             <a:r>
-              <a:rPr lang="de-DE" dirty="0" err="1"/>
+              <a:rPr lang="de-DE" sz="2400" b="1">
+                <a:solidFill>
+                  <a:srgbClr val="008000"/>
+                </a:solidFill>
+                <a:effectLst/>
+                <a:latin typeface="Consolas" panose="020B0609020204030204" pitchFamily="49" charset="0"/>
+              </a:rPr>
               <a:t>class</a:t>
             </a:r>
             <a:r>
-              <a:rPr lang="de-DE" dirty="0"/>
+              <a:rPr lang="de-DE" sz="2400">
+                <a:latin typeface="Consolas" panose="020B0609020204030204" pitchFamily="49" charset="0"/>
+              </a:rPr>
               <a:t> </a:t>
             </a:r>
             <a:r>
-              <a:rPr lang="de-DE" dirty="0" err="1"/>
+              <a:rPr lang="de-DE" sz="2400" b="1">
+                <a:solidFill>
+                  <a:srgbClr val="0000FF"/>
+                </a:solidFill>
+                <a:effectLst/>
+                <a:latin typeface="Consolas" panose="020B0609020204030204" pitchFamily="49" charset="0"/>
+              </a:rPr>
               <a:t>MyClass</a:t>
             </a:r>
             <a:r>
-              <a:rPr lang="de-DE" dirty="0"/>
+              <a:rPr lang="de-DE" sz="2400">
+                <a:latin typeface="Consolas" panose="020B0609020204030204" pitchFamily="49" charset="0"/>
+              </a:rPr>
               <a:t> {</a:t>
             </a:r>
-          </a:p>
-          <a:p>
-            <a:r>
-              <a:rPr lang="de-DE" dirty="0"/>
-              <a:t>  </a:t>
-            </a:r>
-            <a:r>
-              <a:rPr lang="de-DE" dirty="0" err="1"/>
+            <a:br>
+              <a:rPr lang="de-DE" sz="2400">
+                <a:latin typeface="Consolas" panose="020B0609020204030204" pitchFamily="49" charset="0"/>
+              </a:rPr>
+            </a:br>
+            <a:r>
+              <a:rPr lang="de-DE" sz="2400">
+                <a:latin typeface="Consolas" panose="020B0609020204030204" pitchFamily="49" charset="0"/>
+              </a:rPr>
+              <a:t>  </a:t>
+            </a:r>
+            <a:r>
+              <a:rPr lang="de-DE" sz="2400" b="1">
+                <a:solidFill>
+                  <a:srgbClr val="008000"/>
+                </a:solidFill>
+                <a:effectLst/>
+                <a:latin typeface="Consolas" panose="020B0609020204030204" pitchFamily="49" charset="0"/>
+              </a:rPr>
               <a:t>public</a:t>
             </a:r>
             <a:r>
-              <a:rPr lang="de-DE" dirty="0"/>
+              <a:rPr lang="de-DE" sz="2400">
+                <a:latin typeface="Consolas" panose="020B0609020204030204" pitchFamily="49" charset="0"/>
+              </a:rPr>
               <a:t> </a:t>
             </a:r>
             <a:r>
-              <a:rPr lang="de-DE" dirty="0" err="1"/>
+              <a:rPr lang="de-DE" sz="2400" b="1">
+                <a:solidFill>
+                  <a:srgbClr val="008000"/>
+                </a:solidFill>
+                <a:effectLst/>
+                <a:latin typeface="Consolas" panose="020B0609020204030204" pitchFamily="49" charset="0"/>
+              </a:rPr>
               <a:t>static</a:t>
             </a:r>
             <a:r>
-              <a:rPr lang="de-DE" dirty="0"/>
+              <a:rPr lang="de-DE" sz="2400">
+                <a:latin typeface="Consolas" panose="020B0609020204030204" pitchFamily="49" charset="0"/>
+              </a:rPr>
               <a:t> </a:t>
             </a:r>
             <a:r>
-              <a:rPr lang="de-DE" dirty="0" err="1"/>
+              <a:rPr lang="de-DE" sz="2400">
+                <a:solidFill>
+                  <a:srgbClr val="B00040"/>
+                </a:solidFill>
+                <a:effectLst/>
+                <a:latin typeface="Consolas" panose="020B0609020204030204" pitchFamily="49" charset="0"/>
+              </a:rPr>
               <a:t>void</a:t>
             </a:r>
             <a:r>
-              <a:rPr lang="de-DE" dirty="0"/>
+              <a:rPr lang="de-DE" sz="2400">
+                <a:latin typeface="Consolas" panose="020B0609020204030204" pitchFamily="49" charset="0"/>
+              </a:rPr>
               <a:t> </a:t>
             </a:r>
             <a:r>
-              <a:rPr lang="de-DE" dirty="0" err="1"/>
+              <a:rPr lang="de-DE" sz="2400">
+                <a:solidFill>
+                  <a:srgbClr val="0000FF"/>
+                </a:solidFill>
+                <a:effectLst/>
+                <a:latin typeface="Consolas" panose="020B0609020204030204" pitchFamily="49" charset="0"/>
+              </a:rPr>
               <a:t>main</a:t>
             </a:r>
             <a:r>
-              <a:rPr lang="de-DE" dirty="0"/>
-              <a:t>(String[] </a:t>
-            </a:r>
-            <a:r>
-              <a:rPr lang="de-DE" dirty="0" err="1"/>
-              <a:t>args</a:t>
-            </a:r>
-            <a:r>
-              <a:rPr lang="de-DE" dirty="0"/>
-              <a:t>) {</a:t>
-            </a:r>
-          </a:p>
-          <a:p>
-            <a:r>
-              <a:rPr lang="de-DE" dirty="0"/>
-              <a:t>    String </a:t>
-            </a:r>
-            <a:r>
-              <a:rPr lang="de-DE" dirty="0" err="1"/>
-              <a:t>name</a:t>
-            </a:r>
-            <a:r>
-              <a:rPr lang="de-DE" dirty="0"/>
-              <a:t> = </a:t>
-            </a:r>
-            <a:r>
-              <a:rPr lang="de-DE"/>
-              <a:t>"Test";</a:t>
-            </a:r>
-            <a:endParaRPr lang="de-DE" dirty="0"/>
-          </a:p>
-          <a:p>
-            <a:r>
-              <a:rPr lang="de-DE" dirty="0"/>
-              <a:t>    </a:t>
-            </a:r>
-            <a:r>
-              <a:rPr lang="de-DE" dirty="0" err="1"/>
-              <a:t>System.out.println</a:t>
-            </a:r>
-            <a:r>
-              <a:rPr lang="de-DE" dirty="0"/>
-              <a:t>("Hello " + </a:t>
-            </a:r>
-            <a:r>
-              <a:rPr lang="de-DE" dirty="0" err="1"/>
-              <a:t>name</a:t>
-            </a:r>
-            <a:r>
-              <a:rPr lang="de-DE" dirty="0"/>
-              <a:t>);</a:t>
-            </a:r>
-          </a:p>
-          <a:p>
-            <a:r>
-              <a:rPr lang="de-DE" dirty="0"/>
-              <a:t>  }</a:t>
-            </a:r>
-          </a:p>
-          <a:p>
-            <a:r>
-              <a:rPr lang="de-DE" dirty="0"/>
+              <a:rPr lang="de-DE" sz="2400">
+                <a:latin typeface="Consolas" panose="020B0609020204030204" pitchFamily="49" charset="0"/>
+              </a:rPr>
+              <a:t>(String</a:t>
+            </a:r>
+            <a:r>
+              <a:rPr lang="de-DE" sz="2400">
+                <a:solidFill>
+                  <a:srgbClr val="666666"/>
+                </a:solidFill>
+                <a:effectLst/>
+                <a:latin typeface="Consolas" panose="020B0609020204030204" pitchFamily="49" charset="0"/>
+              </a:rPr>
+              <a:t>[]</a:t>
+            </a:r>
+            <a:r>
+              <a:rPr lang="de-DE" sz="2400">
+                <a:latin typeface="Consolas" panose="020B0609020204030204" pitchFamily="49" charset="0"/>
+              </a:rPr>
+              <a:t> args) {</a:t>
+            </a:r>
+            <a:br>
+              <a:rPr lang="de-DE" sz="2400">
+                <a:latin typeface="Consolas" panose="020B0609020204030204" pitchFamily="49" charset="0"/>
+              </a:rPr>
+            </a:br>
+            <a:r>
+              <a:rPr lang="de-DE" sz="2400">
+                <a:latin typeface="Consolas" panose="020B0609020204030204" pitchFamily="49" charset="0"/>
+              </a:rPr>
+              <a:t>    String name </a:t>
+            </a:r>
+            <a:r>
+              <a:rPr lang="de-DE" sz="2400">
+                <a:solidFill>
+                  <a:srgbClr val="666666"/>
+                </a:solidFill>
+                <a:effectLst/>
+                <a:latin typeface="Consolas" panose="020B0609020204030204" pitchFamily="49" charset="0"/>
+              </a:rPr>
+              <a:t>=</a:t>
+            </a:r>
+            <a:r>
+              <a:rPr lang="de-DE" sz="2400">
+                <a:latin typeface="Consolas" panose="020B0609020204030204" pitchFamily="49" charset="0"/>
+              </a:rPr>
+              <a:t> </a:t>
+            </a:r>
+            <a:r>
+              <a:rPr lang="de-DE" sz="2400">
+                <a:solidFill>
+                  <a:srgbClr val="BA2121"/>
+                </a:solidFill>
+                <a:effectLst/>
+                <a:latin typeface="Consolas" panose="020B0609020204030204" pitchFamily="49" charset="0"/>
+              </a:rPr>
+              <a:t>"Test"</a:t>
+            </a:r>
+            <a:r>
+              <a:rPr lang="de-DE" sz="2400">
+                <a:latin typeface="Consolas" panose="020B0609020204030204" pitchFamily="49" charset="0"/>
+              </a:rPr>
+              <a:t>;</a:t>
+            </a:r>
+            <a:br>
+              <a:rPr lang="de-DE" sz="2400">
+                <a:latin typeface="Consolas" panose="020B0609020204030204" pitchFamily="49" charset="0"/>
+              </a:rPr>
+            </a:br>
+            <a:r>
+              <a:rPr lang="de-DE" sz="2400">
+                <a:latin typeface="Consolas" panose="020B0609020204030204" pitchFamily="49" charset="0"/>
+              </a:rPr>
+              <a:t>    System.</a:t>
+            </a:r>
+            <a:r>
+              <a:rPr lang="de-DE" sz="2400">
+                <a:solidFill>
+                  <a:srgbClr val="7D9029"/>
+                </a:solidFill>
+                <a:effectLst/>
+                <a:latin typeface="Consolas" panose="020B0609020204030204" pitchFamily="49" charset="0"/>
+              </a:rPr>
+              <a:t>out</a:t>
+            </a:r>
+            <a:r>
+              <a:rPr lang="de-DE" sz="2400">
+                <a:latin typeface="Consolas" panose="020B0609020204030204" pitchFamily="49" charset="0"/>
+              </a:rPr>
+              <a:t>.</a:t>
+            </a:r>
+            <a:r>
+              <a:rPr lang="de-DE" sz="2400">
+                <a:solidFill>
+                  <a:srgbClr val="7D9029"/>
+                </a:solidFill>
+                <a:effectLst/>
+                <a:latin typeface="Consolas" panose="020B0609020204030204" pitchFamily="49" charset="0"/>
+              </a:rPr>
+              <a:t>println</a:t>
+            </a:r>
+            <a:r>
+              <a:rPr lang="de-DE" sz="2400">
+                <a:latin typeface="Consolas" panose="020B0609020204030204" pitchFamily="49" charset="0"/>
+              </a:rPr>
+              <a:t>(</a:t>
+            </a:r>
+            <a:r>
+              <a:rPr lang="de-DE" sz="2400">
+                <a:solidFill>
+                  <a:srgbClr val="BA2121"/>
+                </a:solidFill>
+                <a:effectLst/>
+                <a:latin typeface="Consolas" panose="020B0609020204030204" pitchFamily="49" charset="0"/>
+              </a:rPr>
+              <a:t>"Hello "</a:t>
+            </a:r>
+            <a:r>
+              <a:rPr lang="de-DE" sz="2400">
+                <a:latin typeface="Consolas" panose="020B0609020204030204" pitchFamily="49" charset="0"/>
+              </a:rPr>
+              <a:t> </a:t>
+            </a:r>
+            <a:r>
+              <a:rPr lang="de-DE" sz="2400">
+                <a:solidFill>
+                  <a:srgbClr val="666666"/>
+                </a:solidFill>
+                <a:effectLst/>
+                <a:latin typeface="Consolas" panose="020B0609020204030204" pitchFamily="49" charset="0"/>
+              </a:rPr>
+              <a:t>+</a:t>
+            </a:r>
+            <a:r>
+              <a:rPr lang="de-DE" sz="2400">
+                <a:latin typeface="Consolas" panose="020B0609020204030204" pitchFamily="49" charset="0"/>
+              </a:rPr>
+              <a:t> name);</a:t>
+            </a:r>
+            <a:br>
+              <a:rPr lang="de-DE" sz="2400">
+                <a:latin typeface="Consolas" panose="020B0609020204030204" pitchFamily="49" charset="0"/>
+              </a:rPr>
+            </a:br>
+            <a:r>
+              <a:rPr lang="de-DE" sz="2400">
+                <a:latin typeface="Consolas" panose="020B0609020204030204" pitchFamily="49" charset="0"/>
+              </a:rPr>
+              <a:t>  }</a:t>
+            </a:r>
+            <a:br>
+              <a:rPr lang="de-DE" sz="2400">
+                <a:latin typeface="Consolas" panose="020B0609020204030204" pitchFamily="49" charset="0"/>
+              </a:rPr>
+            </a:br>
+            <a:r>
+              <a:rPr lang="de-DE" sz="2400">
+                <a:latin typeface="Consolas" panose="020B0609020204030204" pitchFamily="49" charset="0"/>
+              </a:rPr>
               <a:t>}</a:t>
             </a:r>
-          </a:p>
-          <a:p>
-            <a:endParaRPr lang="de-DE" dirty="0"/>
+            <a:endParaRPr lang="de-DE" sz="2400" dirty="0">
+              <a:latin typeface="Consolas" panose="020B0609020204030204" pitchFamily="49" charset="0"/>
+            </a:endParaRPr>
           </a:p>
         </p:txBody>
       </p:sp>

</xml_diff>